<commit_message>
add more test for several animation type and transform static public fct into a class with methods
</commit_message>
<xml_diff>
--- a/tests/slide animation 02.pptx
+++ b/tests/slide animation 02.pptx
@@ -197,7 +197,7 @@
           <a:p>
             <a:fld id="{44F0DB55-EF88-4D00-815E-88BEEF1C369C}" type="datetimeFigureOut">
               <a:rPr lang="en-GB" smtClean="0"/>
-              <a:t>11/12/2023</a:t>
+              <a:t>12/12/2023</a:t>
             </a:fld>
             <a:endParaRPr lang="en-GB"/>
           </a:p>
@@ -710,7 +710,7 @@
           <a:p>
             <a:fld id="{7E42036B-9DF8-4FD4-84B6-AFD447583EA5}" type="datetimeFigureOut">
               <a:rPr lang="en-GB" smtClean="0"/>
-              <a:t>11/12/2023</a:t>
+              <a:t>12/12/2023</a:t>
             </a:fld>
             <a:endParaRPr lang="en-GB"/>
           </a:p>
@@ -910,7 +910,7 @@
           <a:p>
             <a:fld id="{7E42036B-9DF8-4FD4-84B6-AFD447583EA5}" type="datetimeFigureOut">
               <a:rPr lang="en-GB" smtClean="0"/>
-              <a:t>11/12/2023</a:t>
+              <a:t>12/12/2023</a:t>
             </a:fld>
             <a:endParaRPr lang="en-GB"/>
           </a:p>
@@ -1120,7 +1120,7 @@
           <a:p>
             <a:fld id="{7E42036B-9DF8-4FD4-84B6-AFD447583EA5}" type="datetimeFigureOut">
               <a:rPr lang="en-GB" smtClean="0"/>
-              <a:t>11/12/2023</a:t>
+              <a:t>12/12/2023</a:t>
             </a:fld>
             <a:endParaRPr lang="en-GB"/>
           </a:p>
@@ -1320,7 +1320,7 @@
           <a:p>
             <a:fld id="{7E42036B-9DF8-4FD4-84B6-AFD447583EA5}" type="datetimeFigureOut">
               <a:rPr lang="en-GB" smtClean="0"/>
-              <a:t>11/12/2023</a:t>
+              <a:t>12/12/2023</a:t>
             </a:fld>
             <a:endParaRPr lang="en-GB"/>
           </a:p>
@@ -1596,7 +1596,7 @@
           <a:p>
             <a:fld id="{7E42036B-9DF8-4FD4-84B6-AFD447583EA5}" type="datetimeFigureOut">
               <a:rPr lang="en-GB" smtClean="0"/>
-              <a:t>11/12/2023</a:t>
+              <a:t>12/12/2023</a:t>
             </a:fld>
             <a:endParaRPr lang="en-GB"/>
           </a:p>
@@ -1864,7 +1864,7 @@
           <a:p>
             <a:fld id="{7E42036B-9DF8-4FD4-84B6-AFD447583EA5}" type="datetimeFigureOut">
               <a:rPr lang="en-GB" smtClean="0"/>
-              <a:t>11/12/2023</a:t>
+              <a:t>12/12/2023</a:t>
             </a:fld>
             <a:endParaRPr lang="en-GB"/>
           </a:p>
@@ -2279,7 +2279,7 @@
           <a:p>
             <a:fld id="{7E42036B-9DF8-4FD4-84B6-AFD447583EA5}" type="datetimeFigureOut">
               <a:rPr lang="en-GB" smtClean="0"/>
-              <a:t>11/12/2023</a:t>
+              <a:t>12/12/2023</a:t>
             </a:fld>
             <a:endParaRPr lang="en-GB"/>
           </a:p>
@@ -2421,7 +2421,7 @@
           <a:p>
             <a:fld id="{7E42036B-9DF8-4FD4-84B6-AFD447583EA5}" type="datetimeFigureOut">
               <a:rPr lang="en-GB" smtClean="0"/>
-              <a:t>11/12/2023</a:t>
+              <a:t>12/12/2023</a:t>
             </a:fld>
             <a:endParaRPr lang="en-GB"/>
           </a:p>
@@ -2534,7 +2534,7 @@
           <a:p>
             <a:fld id="{7E42036B-9DF8-4FD4-84B6-AFD447583EA5}" type="datetimeFigureOut">
               <a:rPr lang="en-GB" smtClean="0"/>
-              <a:t>11/12/2023</a:t>
+              <a:t>12/12/2023</a:t>
             </a:fld>
             <a:endParaRPr lang="en-GB"/>
           </a:p>
@@ -2847,7 +2847,7 @@
           <a:p>
             <a:fld id="{7E42036B-9DF8-4FD4-84B6-AFD447583EA5}" type="datetimeFigureOut">
               <a:rPr lang="en-GB" smtClean="0"/>
-              <a:t>11/12/2023</a:t>
+              <a:t>12/12/2023</a:t>
             </a:fld>
             <a:endParaRPr lang="en-GB"/>
           </a:p>
@@ -3136,7 +3136,7 @@
           <a:p>
             <a:fld id="{7E42036B-9DF8-4FD4-84B6-AFD447583EA5}" type="datetimeFigureOut">
               <a:rPr lang="en-GB" smtClean="0"/>
-              <a:t>11/12/2023</a:t>
+              <a:t>12/12/2023</a:t>
             </a:fld>
             <a:endParaRPr lang="en-GB"/>
           </a:p>
@@ -3379,7 +3379,7 @@
           <a:p>
             <a:fld id="{7E42036B-9DF8-4FD4-84B6-AFD447583EA5}" type="datetimeFigureOut">
               <a:rPr lang="en-GB" smtClean="0"/>
-              <a:t>11/12/2023</a:t>
+              <a:t>12/12/2023</a:t>
             </a:fld>
             <a:endParaRPr lang="en-GB"/>
           </a:p>
@@ -4185,6 +4185,45 @@
                       </p:childTnLst>
                     </p:cTn>
                   </p:par>
+                  <p:par>
+                    <p:cTn id="14" fill="hold">
+                      <p:stCondLst>
+                        <p:cond delay="indefinite"/>
+                      </p:stCondLst>
+                      <p:childTnLst>
+                        <p:par>
+                          <p:cTn id="15" fill="hold">
+                            <p:stCondLst>
+                              <p:cond delay="0"/>
+                            </p:stCondLst>
+                            <p:childTnLst>
+                              <p:par>
+                                <p:cTn id="16" presetID="1" presetClass="path" presetSubtype="0" accel="50000" decel="50000" fill="hold" grpId="0" nodeType="clickEffect">
+                                  <p:stCondLst>
+                                    <p:cond delay="2000"/>
+                                  </p:stCondLst>
+                                  <p:childTnLst>
+                                    <p:animMotion origin="layout" path="M 0 0 C 0.069 0 0.125 0.056 0.125 0.125 C 0.125 0.194 0.069 0.25 0 0.25 C -0.069 0.25 -0.125 0.194 -0.125 0.125 C -0.125 0.056 -0.069 0 0 0 Z" pathEditMode="relative" ptsTypes="">
+                                      <p:cBhvr>
+                                        <p:cTn id="17" dur="2000" fill="hold"/>
+                                        <p:tgtEl>
+                                          <p:spTgt spid="6"/>
+                                        </p:tgtEl>
+                                        <p:attrNameLst>
+                                          <p:attrName>ppt_x</p:attrName>
+                                          <p:attrName>ppt_y</p:attrName>
+                                        </p:attrNameLst>
+                                      </p:cBhvr>
+                                    </p:animMotion>
+                                  </p:childTnLst>
+                                </p:cTn>
+                              </p:par>
+                            </p:childTnLst>
+                          </p:cTn>
+                        </p:par>
+                      </p:childTnLst>
+                    </p:cTn>
+                  </p:par>
                 </p:childTnLst>
               </p:cTn>
               <p:prevCondLst>
@@ -4207,6 +4246,7 @@
       </p:par>
     </p:tnLst>
     <p:bldLst>
+      <p:bldP spid="6" grpId="0" animBg="1"/>
       <p:bldP spid="2" grpId="0" animBg="1"/>
       <p:bldP spid="3" grpId="0" animBg="1"/>
     </p:bldLst>

</xml_diff>